<commit_message>
R code and csv dataset by @AnaniSkywalker
</commit_message>
<xml_diff>
--- a/Presentation1.pptx
+++ b/Presentation1.pptx
@@ -6,6 +6,9 @@
   </p:sldMasterIdLst>
   <p:sldIdLst>
     <p:sldId id="256" r:id="rId2"/>
+    <p:sldId id="257" r:id="rId3"/>
+    <p:sldId id="258" r:id="rId4"/>
+    <p:sldId id="259" r:id="rId5"/>
   </p:sldIdLst>
   <p:sldSz cx="12192000" cy="6858000"/>
   <p:notesSz cx="6858000" cy="9144000"/>
@@ -6221,6 +6224,501 @@
 </p:sld>
 </file>
 
+<file path=ppt/slides/slide2.xml><?xml version="1.0" encoding="utf-8"?>
+<p:sld xmlns:a="http://schemas.openxmlformats.org/drawingml/2006/main" xmlns:r="http://schemas.openxmlformats.org/officeDocument/2006/relationships" xmlns:p="http://schemas.openxmlformats.org/presentationml/2006/main">
+  <p:cSld>
+    <p:spTree>
+      <p:nvGrpSpPr>
+        <p:cNvPr id="1" name=""/>
+        <p:cNvGrpSpPr/>
+        <p:nvPr/>
+      </p:nvGrpSpPr>
+      <p:grpSpPr>
+        <a:xfrm>
+          <a:off x="0" y="0"/>
+          <a:ext cx="0" cy="0"/>
+          <a:chOff x="0" y="0"/>
+          <a:chExt cx="0" cy="0"/>
+        </a:xfrm>
+      </p:grpSpPr>
+      <p:sp>
+        <p:nvSpPr>
+          <p:cNvPr id="2" name="Title 1"/>
+          <p:cNvSpPr>
+            <a:spLocks noGrp="1"/>
+          </p:cNvSpPr>
+          <p:nvPr>
+            <p:ph type="title"/>
+          </p:nvPr>
+        </p:nvSpPr>
+        <p:spPr/>
+        <p:txBody>
+          <a:bodyPr/>
+          <a:lstStyle/>
+          <a:p>
+            <a:r>
+              <a:rPr lang="en-US" i="1" dirty="0" smtClean="0">
+                <a:latin typeface="Bookman Old Style" charset="0"/>
+                <a:ea typeface="Bookman Old Style" charset="0"/>
+                <a:cs typeface="Bookman Old Style" charset="0"/>
+              </a:rPr>
+              <a:t>Digital Handwriting Recognizer</a:t>
+            </a:r>
+            <a:endParaRPr lang="en-US" i="1" dirty="0">
+              <a:latin typeface="Bookman Old Style" charset="0"/>
+              <a:ea typeface="Bookman Old Style" charset="0"/>
+              <a:cs typeface="Bookman Old Style" charset="0"/>
+            </a:endParaRPr>
+          </a:p>
+        </p:txBody>
+      </p:sp>
+      <p:sp>
+        <p:nvSpPr>
+          <p:cNvPr id="3" name="Content Placeholder 2"/>
+          <p:cNvSpPr>
+            <a:spLocks noGrp="1"/>
+          </p:cNvSpPr>
+          <p:nvPr>
+            <p:ph idx="1"/>
+          </p:nvPr>
+        </p:nvSpPr>
+        <p:spPr/>
+        <p:txBody>
+          <a:bodyPr/>
+          <a:lstStyle/>
+          <a:p>
+            <a:r>
+              <a:rPr lang="en-US" dirty="0" smtClean="0">
+                <a:latin typeface="Bookman Old Style" charset="0"/>
+                <a:ea typeface="Bookman Old Style" charset="0"/>
+                <a:cs typeface="Bookman Old Style" charset="0"/>
+              </a:rPr>
+              <a:t>Read in the training dataset and testing dataset from Kaggle</a:t>
+            </a:r>
+          </a:p>
+          <a:p>
+            <a:r>
+              <a:rPr lang="en-US" dirty="0" smtClean="0">
+                <a:latin typeface="Bookman Old Style" charset="0"/>
+                <a:ea typeface="Bookman Old Style" charset="0"/>
+                <a:cs typeface="Bookman Old Style" charset="0"/>
+              </a:rPr>
+              <a:t>Make the dataset (training dataset) smaller</a:t>
+            </a:r>
+          </a:p>
+          <a:p>
+            <a:pPr lvl="1"/>
+            <a:r>
+              <a:rPr lang="en-US" dirty="0" smtClean="0">
+                <a:latin typeface="Bookman Old Style" charset="0"/>
+                <a:ea typeface="Bookman Old Style" charset="0"/>
+                <a:cs typeface="Bookman Old Style" charset="0"/>
+              </a:rPr>
+              <a:t>Because the dataset has 42,000 Observations (</a:t>
+            </a:r>
+            <a:r>
+              <a:rPr lang="en-US" dirty="0" err="1" smtClean="0">
+                <a:latin typeface="Bookman Old Style" charset="0"/>
+                <a:ea typeface="Bookman Old Style" charset="0"/>
+                <a:cs typeface="Bookman Old Style" charset="0"/>
+              </a:rPr>
+              <a:t>obs</a:t>
+            </a:r>
+            <a:r>
+              <a:rPr lang="en-US" dirty="0" smtClean="0">
+                <a:latin typeface="Bookman Old Style" charset="0"/>
+                <a:ea typeface="Bookman Old Style" charset="0"/>
+                <a:cs typeface="Bookman Old Style" charset="0"/>
+              </a:rPr>
+              <a:t>) and 785 variables</a:t>
+            </a:r>
+          </a:p>
+          <a:p>
+            <a:pPr lvl="1"/>
+            <a:r>
+              <a:rPr lang="en-US" dirty="0" smtClean="0">
+                <a:latin typeface="Bookman Old Style" charset="0"/>
+                <a:ea typeface="Bookman Old Style" charset="0"/>
+                <a:cs typeface="Bookman Old Style" charset="0"/>
+              </a:rPr>
+              <a:t>No way we would be able to run ‘</a:t>
+            </a:r>
+            <a:r>
+              <a:rPr lang="en-US" dirty="0" err="1" smtClean="0">
+                <a:latin typeface="Bookman Old Style" charset="0"/>
+                <a:ea typeface="Bookman Old Style" charset="0"/>
+                <a:cs typeface="Bookman Old Style" charset="0"/>
+              </a:rPr>
+              <a:t>specc</a:t>
+            </a:r>
+            <a:r>
+              <a:rPr lang="en-US" dirty="0" smtClean="0">
+                <a:latin typeface="Bookman Old Style" charset="0"/>
+                <a:ea typeface="Bookman Old Style" charset="0"/>
+                <a:cs typeface="Bookman Old Style" charset="0"/>
+              </a:rPr>
+              <a:t>()’ on 42,000 </a:t>
+            </a:r>
+            <a:r>
+              <a:rPr lang="en-US" dirty="0" err="1" smtClean="0">
+                <a:latin typeface="Bookman Old Style" charset="0"/>
+                <a:ea typeface="Bookman Old Style" charset="0"/>
+                <a:cs typeface="Bookman Old Style" charset="0"/>
+              </a:rPr>
+              <a:t>obs</a:t>
+            </a:r>
+            <a:r>
+              <a:rPr lang="en-US" dirty="0" smtClean="0">
+                <a:latin typeface="Bookman Old Style" charset="0"/>
+                <a:ea typeface="Bookman Old Style" charset="0"/>
+                <a:cs typeface="Bookman Old Style" charset="0"/>
+              </a:rPr>
+              <a:t> on a laptop</a:t>
+            </a:r>
+          </a:p>
+          <a:p>
+            <a:r>
+              <a:rPr lang="en-US" dirty="0" smtClean="0">
+                <a:latin typeface="Bookman Old Style" charset="0"/>
+                <a:ea typeface="Bookman Old Style" charset="0"/>
+                <a:cs typeface="Bookman Old Style" charset="0"/>
+              </a:rPr>
+              <a:t>Next, delete the labels from the </a:t>
+            </a:r>
+            <a:r>
+              <a:rPr lang="en-US" dirty="0" err="1" smtClean="0">
+                <a:latin typeface="Bookman Old Style" charset="0"/>
+                <a:ea typeface="Bookman Old Style" charset="0"/>
+                <a:cs typeface="Bookman Old Style" charset="0"/>
+              </a:rPr>
+              <a:t>obs</a:t>
+            </a:r>
+            <a:r>
+              <a:rPr lang="en-US" dirty="0" smtClean="0">
+                <a:latin typeface="Bookman Old Style" charset="0"/>
+                <a:ea typeface="Bookman Old Style" charset="0"/>
+                <a:cs typeface="Bookman Old Style" charset="0"/>
+              </a:rPr>
+              <a:t> from Column 2 to the end.</a:t>
+            </a:r>
+            <a:endParaRPr lang="en-US" dirty="0">
+              <a:latin typeface="Bookman Old Style" charset="0"/>
+              <a:ea typeface="Bookman Old Style" charset="0"/>
+              <a:cs typeface="Bookman Old Style" charset="0"/>
+            </a:endParaRPr>
+          </a:p>
+        </p:txBody>
+      </p:sp>
+    </p:spTree>
+    <p:extLst>
+      <p:ext uri="{BB962C8B-B14F-4D97-AF65-F5344CB8AC3E}">
+        <p14:creationId xmlns:p14="http://schemas.microsoft.com/office/powerpoint/2010/main" val="422597759"/>
+      </p:ext>
+    </p:extLst>
+  </p:cSld>
+  <p:clrMapOvr>
+    <a:masterClrMapping/>
+  </p:clrMapOvr>
+</p:sld>
+</file>
+
+<file path=ppt/slides/slide3.xml><?xml version="1.0" encoding="utf-8"?>
+<p:sld xmlns:a="http://schemas.openxmlformats.org/drawingml/2006/main" xmlns:r="http://schemas.openxmlformats.org/officeDocument/2006/relationships" xmlns:p="http://schemas.openxmlformats.org/presentationml/2006/main">
+  <p:cSld>
+    <p:spTree>
+      <p:nvGrpSpPr>
+        <p:cNvPr id="1" name=""/>
+        <p:cNvGrpSpPr/>
+        <p:nvPr/>
+      </p:nvGrpSpPr>
+      <p:grpSpPr>
+        <a:xfrm>
+          <a:off x="0" y="0"/>
+          <a:ext cx="0" cy="0"/>
+          <a:chOff x="0" y="0"/>
+          <a:chExt cx="0" cy="0"/>
+        </a:xfrm>
+      </p:grpSpPr>
+      <p:sp>
+        <p:nvSpPr>
+          <p:cNvPr id="2" name="Title 1"/>
+          <p:cNvSpPr>
+            <a:spLocks noGrp="1"/>
+          </p:cNvSpPr>
+          <p:nvPr>
+            <p:ph type="title"/>
+          </p:nvPr>
+        </p:nvSpPr>
+        <p:spPr/>
+        <p:txBody>
+          <a:bodyPr/>
+          <a:lstStyle/>
+          <a:p>
+            <a:r>
+              <a:rPr lang="en-US" i="1" dirty="0" smtClean="0">
+                <a:latin typeface="Bookman Old Style" charset="0"/>
+                <a:ea typeface="Bookman Old Style" charset="0"/>
+                <a:cs typeface="Bookman Old Style" charset="0"/>
+              </a:rPr>
+              <a:t>Digital Handwriting Recognizer</a:t>
+            </a:r>
+            <a:endParaRPr lang="en-US" i="1" dirty="0">
+              <a:latin typeface="Bookman Old Style" charset="0"/>
+              <a:ea typeface="Bookman Old Style" charset="0"/>
+              <a:cs typeface="Bookman Old Style" charset="0"/>
+            </a:endParaRPr>
+          </a:p>
+        </p:txBody>
+      </p:sp>
+      <p:sp>
+        <p:nvSpPr>
+          <p:cNvPr id="3" name="Content Placeholder 2"/>
+          <p:cNvSpPr>
+            <a:spLocks noGrp="1"/>
+          </p:cNvSpPr>
+          <p:nvPr>
+            <p:ph idx="1"/>
+          </p:nvPr>
+        </p:nvSpPr>
+        <p:spPr/>
+        <p:txBody>
+          <a:bodyPr/>
+          <a:lstStyle/>
+          <a:p>
+            <a:r>
+              <a:rPr lang="en-US" dirty="0" smtClean="0">
+                <a:latin typeface="Bookman Old Style" charset="0"/>
+                <a:ea typeface="Bookman Old Style" charset="0"/>
+                <a:cs typeface="Bookman Old Style" charset="0"/>
+              </a:rPr>
+              <a:t>Here, we ran the specc spectral clustering algorithm to observe the results (on the training dataset without labels)</a:t>
+            </a:r>
+          </a:p>
+          <a:p>
+            <a:pPr lvl="1"/>
+            <a:r>
+              <a:rPr lang="en-US" dirty="0" smtClean="0">
+                <a:latin typeface="Bookman Old Style" charset="0"/>
+                <a:ea typeface="Bookman Old Style" charset="0"/>
+                <a:cs typeface="Bookman Old Style" charset="0"/>
+              </a:rPr>
+              <a:t>We chose 10 clusters because it would not be use to use random rows in the eigenvectors.</a:t>
+            </a:r>
+          </a:p>
+          <a:p>
+            <a:pPr lvl="1"/>
+            <a:r>
+              <a:rPr lang="en-US" dirty="0" smtClean="0">
+                <a:latin typeface="Bookman Old Style" charset="0"/>
+                <a:ea typeface="Bookman Old Style" charset="0"/>
+                <a:cs typeface="Bookman Old Style" charset="0"/>
+              </a:rPr>
+              <a:t>Then we view the result of the specc clusters.</a:t>
+            </a:r>
+          </a:p>
+          <a:p>
+            <a:r>
+              <a:rPr lang="en-US" dirty="0" smtClean="0">
+                <a:latin typeface="Bookman Old Style" charset="0"/>
+                <a:ea typeface="Bookman Old Style" charset="0"/>
+                <a:cs typeface="Bookman Old Style" charset="0"/>
+              </a:rPr>
+              <a:t>Now we choose the specc cluster and select the first 100 sets to observe which variables were selected.</a:t>
+            </a:r>
+            <a:endParaRPr lang="en-US" dirty="0">
+              <a:latin typeface="Bookman Old Style" charset="0"/>
+              <a:ea typeface="Bookman Old Style" charset="0"/>
+              <a:cs typeface="Bookman Old Style" charset="0"/>
+            </a:endParaRPr>
+          </a:p>
+        </p:txBody>
+      </p:sp>
+    </p:spTree>
+    <p:extLst>
+      <p:ext uri="{BB962C8B-B14F-4D97-AF65-F5344CB8AC3E}">
+        <p14:creationId xmlns:p14="http://schemas.microsoft.com/office/powerpoint/2010/main" val="1607103707"/>
+      </p:ext>
+    </p:extLst>
+  </p:cSld>
+  <p:clrMapOvr>
+    <a:masterClrMapping/>
+  </p:clrMapOvr>
+</p:sld>
+</file>
+
+<file path=ppt/slides/slide4.xml><?xml version="1.0" encoding="utf-8"?>
+<p:sld xmlns:a="http://schemas.openxmlformats.org/drawingml/2006/main" xmlns:r="http://schemas.openxmlformats.org/officeDocument/2006/relationships" xmlns:p="http://schemas.openxmlformats.org/presentationml/2006/main">
+  <p:cSld>
+    <p:spTree>
+      <p:nvGrpSpPr>
+        <p:cNvPr id="1" name=""/>
+        <p:cNvGrpSpPr/>
+        <p:nvPr/>
+      </p:nvGrpSpPr>
+      <p:grpSpPr>
+        <a:xfrm>
+          <a:off x="0" y="0"/>
+          <a:ext cx="0" cy="0"/>
+          <a:chOff x="0" y="0"/>
+          <a:chExt cx="0" cy="0"/>
+        </a:xfrm>
+      </p:grpSpPr>
+      <p:sp>
+        <p:nvSpPr>
+          <p:cNvPr id="2" name="Title 1"/>
+          <p:cNvSpPr>
+            <a:spLocks noGrp="1"/>
+          </p:cNvSpPr>
+          <p:nvPr>
+            <p:ph type="title"/>
+          </p:nvPr>
+        </p:nvSpPr>
+        <p:spPr/>
+        <p:txBody>
+          <a:bodyPr/>
+          <a:lstStyle/>
+          <a:p>
+            <a:r>
+              <a:rPr lang="en-US" i="1" dirty="0" smtClean="0">
+                <a:latin typeface="Bookman Old Style" charset="0"/>
+                <a:ea typeface="Bookman Old Style" charset="0"/>
+                <a:cs typeface="Bookman Old Style" charset="0"/>
+              </a:rPr>
+              <a:t>Digital Handwriting Recognizer</a:t>
+            </a:r>
+            <a:endParaRPr lang="en-US" i="1" dirty="0">
+              <a:latin typeface="Bookman Old Style" charset="0"/>
+              <a:ea typeface="Bookman Old Style" charset="0"/>
+              <a:cs typeface="Bookman Old Style" charset="0"/>
+            </a:endParaRPr>
+          </a:p>
+        </p:txBody>
+      </p:sp>
+      <p:sp>
+        <p:nvSpPr>
+          <p:cNvPr id="3" name="Content Placeholder 2"/>
+          <p:cNvSpPr>
+            <a:spLocks noGrp="1"/>
+          </p:cNvSpPr>
+          <p:nvPr>
+            <p:ph idx="1"/>
+          </p:nvPr>
+        </p:nvSpPr>
+        <p:spPr/>
+        <p:txBody>
+          <a:bodyPr>
+            <a:normAutofit/>
+          </a:bodyPr>
+          <a:lstStyle/>
+          <a:p>
+            <a:r>
+              <a:rPr lang="en-US" dirty="0" smtClean="0">
+                <a:latin typeface="Bookman Old Style" charset="0"/>
+                <a:ea typeface="Bookman Old Style" charset="0"/>
+                <a:cs typeface="Bookman Old Style" charset="0"/>
+              </a:rPr>
+              <a:t>We view the size of the vector for each point in the cluster</a:t>
+            </a:r>
+          </a:p>
+          <a:p>
+            <a:pPr lvl="1"/>
+            <a:r>
+              <a:rPr lang="en-US" dirty="0">
+                <a:latin typeface="Bookman Old Style" charset="0"/>
+                <a:ea typeface="Bookman Old Style" charset="0"/>
+                <a:cs typeface="Bookman Old Style" charset="0"/>
+              </a:rPr>
+              <a:t>size(</a:t>
+            </a:r>
+            <a:r>
+              <a:rPr lang="en-US" dirty="0" err="1">
+                <a:latin typeface="Bookman Old Style" charset="0"/>
+                <a:ea typeface="Bookman Old Style" charset="0"/>
+                <a:cs typeface="Bookman Old Style" charset="0"/>
+              </a:rPr>
+              <a:t>digits.cluster</a:t>
+            </a:r>
+            <a:r>
+              <a:rPr lang="en-US" dirty="0">
+                <a:latin typeface="Bookman Old Style" charset="0"/>
+                <a:ea typeface="Bookman Old Style" charset="0"/>
+                <a:cs typeface="Bookman Old Style" charset="0"/>
+              </a:rPr>
+              <a:t>)</a:t>
+            </a:r>
+            <a:endParaRPr lang="en-US" dirty="0" smtClean="0">
+              <a:latin typeface="Bookman Old Style" charset="0"/>
+              <a:ea typeface="Bookman Old Style" charset="0"/>
+              <a:cs typeface="Bookman Old Style" charset="0"/>
+            </a:endParaRPr>
+          </a:p>
+          <a:p>
+            <a:r>
+              <a:rPr lang="en-US" dirty="0" smtClean="0">
+                <a:latin typeface="Bookman Old Style" charset="0"/>
+                <a:ea typeface="Bookman Old Style" charset="0"/>
+                <a:cs typeface="Bookman Old Style" charset="0"/>
+              </a:rPr>
+              <a:t>Then we view the sum of squares for each cluster within the cluster</a:t>
+            </a:r>
+          </a:p>
+          <a:p>
+            <a:pPr lvl="1"/>
+            <a:r>
+              <a:rPr lang="en-US" dirty="0" err="1">
+                <a:latin typeface="Bookman Old Style" charset="0"/>
+                <a:ea typeface="Bookman Old Style" charset="0"/>
+                <a:cs typeface="Bookman Old Style" charset="0"/>
+              </a:rPr>
+              <a:t>withinss</a:t>
+            </a:r>
+            <a:r>
+              <a:rPr lang="en-US" dirty="0">
+                <a:latin typeface="Bookman Old Style" charset="0"/>
+                <a:ea typeface="Bookman Old Style" charset="0"/>
+                <a:cs typeface="Bookman Old Style" charset="0"/>
+              </a:rPr>
+              <a:t>(</a:t>
+            </a:r>
+            <a:r>
+              <a:rPr lang="en-US" dirty="0" err="1">
+                <a:latin typeface="Bookman Old Style" charset="0"/>
+                <a:ea typeface="Bookman Old Style" charset="0"/>
+                <a:cs typeface="Bookman Old Style" charset="0"/>
+              </a:rPr>
+              <a:t>digits.cluster</a:t>
+            </a:r>
+            <a:r>
+              <a:rPr lang="en-US" dirty="0">
+                <a:latin typeface="Bookman Old Style" charset="0"/>
+                <a:ea typeface="Bookman Old Style" charset="0"/>
+                <a:cs typeface="Bookman Old Style" charset="0"/>
+              </a:rPr>
+              <a:t>)</a:t>
+            </a:r>
+          </a:p>
+          <a:p>
+            <a:endParaRPr lang="en-US" dirty="0">
+              <a:latin typeface="Bookman Old Style" charset="0"/>
+              <a:ea typeface="Bookman Old Style" charset="0"/>
+              <a:cs typeface="Bookman Old Style" charset="0"/>
+            </a:endParaRPr>
+          </a:p>
+        </p:txBody>
+      </p:sp>
+    </p:spTree>
+    <p:extLst>
+      <p:ext uri="{BB962C8B-B14F-4D97-AF65-F5344CB8AC3E}">
+        <p14:creationId xmlns:p14="http://schemas.microsoft.com/office/powerpoint/2010/main" val="1593786749"/>
+      </p:ext>
+    </p:extLst>
+  </p:cSld>
+  <p:clrMapOvr>
+    <a:masterClrMapping/>
+  </p:clrMapOvr>
+</p:sld>
+</file>
+
 <file path=ppt/theme/theme1.xml><?xml version="1.0" encoding="utf-8"?>
 <a:theme xmlns:a="http://schemas.openxmlformats.org/drawingml/2006/main" name="Parallax">
   <a:themeElements>

</xml_diff>